<commit_message>
Adding tiny change in order of slides
</commit_message>
<xml_diff>
--- a/EuroPython2021/Leveraging Linked Data using Python and SPARQL.pptx
+++ b/EuroPython2021/Leveraging Linked Data using Python and SPARQL.pptx
@@ -12,9 +12,9 @@
     <p:sldId id="257" r:id="rId3"/>
     <p:sldId id="272" r:id="rId4"/>
     <p:sldId id="273" r:id="rId5"/>
-    <p:sldId id="259" r:id="rId6"/>
-    <p:sldId id="269" r:id="rId7"/>
-    <p:sldId id="260" r:id="rId8"/>
+    <p:sldId id="260" r:id="rId6"/>
+    <p:sldId id="259" r:id="rId7"/>
+    <p:sldId id="269" r:id="rId8"/>
     <p:sldId id="261" r:id="rId9"/>
     <p:sldId id="270" r:id="rId10"/>
     <p:sldId id="263" r:id="rId11"/>
@@ -339,7 +339,7 @@
           <a:p>
             <a:fld id="{5E32DCF0-C351-4D66-9562-3972F92CC463}" type="datetimeFigureOut">
               <a:rPr lang="en-GB" smtClean="0"/>
-              <a:t>27/07/2021</a:t>
+              <a:t>28/07/2021</a:t>
             </a:fld>
             <a:endParaRPr lang="en-GB"/>
           </a:p>
@@ -1098,7 +1098,7 @@
           <a:p>
             <a:fld id="{451B0464-8779-4BFF-88B2-1AEED37D54E3}" type="datetimeFigureOut">
               <a:rPr lang="en-GB" smtClean="0"/>
-              <a:t>27/07/2021</a:t>
+              <a:t>28/07/2021</a:t>
             </a:fld>
             <a:endParaRPr lang="en-GB"/>
           </a:p>
@@ -1298,7 +1298,7 @@
           <a:p>
             <a:fld id="{451B0464-8779-4BFF-88B2-1AEED37D54E3}" type="datetimeFigureOut">
               <a:rPr lang="en-GB" smtClean="0"/>
-              <a:t>27/07/2021</a:t>
+              <a:t>28/07/2021</a:t>
             </a:fld>
             <a:endParaRPr lang="en-GB"/>
           </a:p>
@@ -1508,7 +1508,7 @@
           <a:p>
             <a:fld id="{451B0464-8779-4BFF-88B2-1AEED37D54E3}" type="datetimeFigureOut">
               <a:rPr lang="en-GB" smtClean="0"/>
-              <a:t>27/07/2021</a:t>
+              <a:t>28/07/2021</a:t>
             </a:fld>
             <a:endParaRPr lang="en-GB"/>
           </a:p>
@@ -1708,7 +1708,7 @@
           <a:p>
             <a:fld id="{451B0464-8779-4BFF-88B2-1AEED37D54E3}" type="datetimeFigureOut">
               <a:rPr lang="en-GB" smtClean="0"/>
-              <a:t>27/07/2021</a:t>
+              <a:t>28/07/2021</a:t>
             </a:fld>
             <a:endParaRPr lang="en-GB"/>
           </a:p>
@@ -1984,7 +1984,7 @@
           <a:p>
             <a:fld id="{451B0464-8779-4BFF-88B2-1AEED37D54E3}" type="datetimeFigureOut">
               <a:rPr lang="en-GB" smtClean="0"/>
-              <a:t>27/07/2021</a:t>
+              <a:t>28/07/2021</a:t>
             </a:fld>
             <a:endParaRPr lang="en-GB"/>
           </a:p>
@@ -2252,7 +2252,7 @@
           <a:p>
             <a:fld id="{451B0464-8779-4BFF-88B2-1AEED37D54E3}" type="datetimeFigureOut">
               <a:rPr lang="en-GB" smtClean="0"/>
-              <a:t>27/07/2021</a:t>
+              <a:t>28/07/2021</a:t>
             </a:fld>
             <a:endParaRPr lang="en-GB"/>
           </a:p>
@@ -2667,7 +2667,7 @@
           <a:p>
             <a:fld id="{451B0464-8779-4BFF-88B2-1AEED37D54E3}" type="datetimeFigureOut">
               <a:rPr lang="en-GB" smtClean="0"/>
-              <a:t>27/07/2021</a:t>
+              <a:t>28/07/2021</a:t>
             </a:fld>
             <a:endParaRPr lang="en-GB"/>
           </a:p>
@@ -2809,7 +2809,7 @@
           <a:p>
             <a:fld id="{451B0464-8779-4BFF-88B2-1AEED37D54E3}" type="datetimeFigureOut">
               <a:rPr lang="en-GB" smtClean="0"/>
-              <a:t>27/07/2021</a:t>
+              <a:t>28/07/2021</a:t>
             </a:fld>
             <a:endParaRPr lang="en-GB"/>
           </a:p>
@@ -2922,7 +2922,7 @@
           <a:p>
             <a:fld id="{451B0464-8779-4BFF-88B2-1AEED37D54E3}" type="datetimeFigureOut">
               <a:rPr lang="en-GB" smtClean="0"/>
-              <a:t>27/07/2021</a:t>
+              <a:t>28/07/2021</a:t>
             </a:fld>
             <a:endParaRPr lang="en-GB"/>
           </a:p>
@@ -3235,7 +3235,7 @@
           <a:p>
             <a:fld id="{451B0464-8779-4BFF-88B2-1AEED37D54E3}" type="datetimeFigureOut">
               <a:rPr lang="en-GB" smtClean="0"/>
-              <a:t>27/07/2021</a:t>
+              <a:t>28/07/2021</a:t>
             </a:fld>
             <a:endParaRPr lang="en-GB"/>
           </a:p>
@@ -3524,7 +3524,7 @@
           <a:p>
             <a:fld id="{451B0464-8779-4BFF-88B2-1AEED37D54E3}" type="datetimeFigureOut">
               <a:rPr lang="en-GB" smtClean="0"/>
-              <a:t>27/07/2021</a:t>
+              <a:t>28/07/2021</a:t>
             </a:fld>
             <a:endParaRPr lang="en-GB"/>
           </a:p>
@@ -3770,7 +3770,7 @@
           <a:p>
             <a:fld id="{451B0464-8779-4BFF-88B2-1AEED37D54E3}" type="datetimeFigureOut">
               <a:rPr lang="en-GB" smtClean="0"/>
-              <a:t>27/07/2021</a:t>
+              <a:t>28/07/2021</a:t>
             </a:fld>
             <a:endParaRPr lang="en-GB"/>
           </a:p>
@@ -6913,10 +6913,10 @@
       </p:sp>
       <p:sp>
         <p:nvSpPr>
-          <p:cNvPr id="23" name="TextBox 22">
-            <a:extLst>
-              <a:ext uri="{FF2B5EF4-FFF2-40B4-BE49-F238E27FC236}">
-                <a16:creationId xmlns:a16="http://schemas.microsoft.com/office/drawing/2014/main" id="{BDE1AEF5-8CC3-429F-82C8-5205D4A9CB0F}"/>
+          <p:cNvPr id="25" name="TextBox 24">
+            <a:extLst>
+              <a:ext uri="{FF2B5EF4-FFF2-40B4-BE49-F238E27FC236}">
+                <a16:creationId xmlns:a16="http://schemas.microsoft.com/office/drawing/2014/main" id="{4CCE93C3-56EF-405A-BF5D-D44F38F7EBCB}"/>
               </a:ext>
             </a:extLst>
           </p:cNvPr>
@@ -6925,8 +6925,8 @@
         </p:nvSpPr>
         <p:spPr>
           <a:xfrm>
-            <a:off x="4748460" y="1517849"/>
-            <a:ext cx="6106390" cy="4801314"/>
+            <a:off x="3529280" y="1950752"/>
+            <a:ext cx="6103398" cy="3970318"/>
           </a:xfrm>
           <a:prstGeom prst="rect">
             <a:avLst/>
@@ -7023,620 +7023,189 @@
               <a:rPr lang="en-GB" dirty="0">
                 <a:latin typeface="Century Gothic" panose="020B0502020202020204" pitchFamily="34" charset="0"/>
               </a:rPr>
-              <a:t>PREFIX ling: &lt;http://purl.org/linguistics/gold/&gt;</a:t>
-            </a:r>
-          </a:p>
-          <a:p>
+              <a:t>SELECT DISTINCT ?a, ?dob, ?</a:t>
+            </a:r>
+            <a:r>
+              <a:rPr lang="en-GB" dirty="0" err="1">
+                <a:latin typeface="Century Gothic" panose="020B0502020202020204" pitchFamily="34" charset="0"/>
+              </a:rPr>
+              <a:t>ht</a:t>
+            </a:r>
             <a:r>
               <a:rPr lang="en-GB" dirty="0">
                 <a:latin typeface="Century Gothic" panose="020B0502020202020204" pitchFamily="34" charset="0"/>
               </a:rPr>
-              <a:t>SELECT </a:t>
-            </a:r>
-            <a:r>
-              <a:rPr lang="en-GB" b="1" dirty="0">
-                <a:latin typeface="Century Gothic" panose="020B0502020202020204" pitchFamily="34" charset="0"/>
-              </a:rPr>
-              <a:t>DISTINCT</a:t>
-            </a:r>
+              <a:t>, ?name, ?c, ?intro</a:t>
+            </a:r>
+          </a:p>
+          <a:p>
             <a:r>
               <a:rPr lang="en-GB" dirty="0">
                 <a:latin typeface="Century Gothic" panose="020B0502020202020204" pitchFamily="34" charset="0"/>
               </a:rPr>
-              <a:t> ?a, ?dob, ?</a:t>
+              <a:t>WHERE</a:t>
+            </a:r>
+          </a:p>
+          <a:p>
+            <a:r>
+              <a:rPr lang="en-GB" dirty="0">
+                <a:latin typeface="Century Gothic" panose="020B0502020202020204" pitchFamily="34" charset="0"/>
+              </a:rPr>
+              <a:t>{</a:t>
+            </a:r>
+          </a:p>
+          <a:p>
+            <a:r>
+              <a:rPr lang="en-GB" dirty="0">
+                <a:latin typeface="Century Gothic" panose="020B0502020202020204" pitchFamily="34" charset="0"/>
+              </a:rPr>
+              <a:t>?a </a:t>
             </a:r>
             <a:r>
               <a:rPr lang="en-GB" dirty="0" err="1">
                 <a:latin typeface="Century Gothic" panose="020B0502020202020204" pitchFamily="34" charset="0"/>
               </a:rPr>
-              <a:t>ht</a:t>
+              <a:t>a</a:t>
             </a:r>
             <a:r>
               <a:rPr lang="en-GB" dirty="0">
                 <a:latin typeface="Century Gothic" panose="020B0502020202020204" pitchFamily="34" charset="0"/>
               </a:rPr>
-              <a:t>, ?</a:t>
+              <a:t> </a:t>
             </a:r>
             <a:r>
               <a:rPr lang="en-GB" dirty="0" err="1">
                 <a:latin typeface="Century Gothic" panose="020B0502020202020204" pitchFamily="34" charset="0"/>
               </a:rPr>
-              <a:t>hpn</a:t>
+              <a:t>dbo:Athlete</a:t>
             </a:r>
             <a:r>
               <a:rPr lang="en-GB" dirty="0">
                 <a:latin typeface="Century Gothic" panose="020B0502020202020204" pitchFamily="34" charset="0"/>
               </a:rPr>
-              <a:t>, ?g, ?name, ?c, ?intro</a:t>
-            </a:r>
-          </a:p>
-          <a:p>
+              <a:t>; </a:t>
+            </a:r>
+            <a:r>
+              <a:rPr lang="en-GB" dirty="0" err="1">
+                <a:latin typeface="Century Gothic" panose="020B0502020202020204" pitchFamily="34" charset="0"/>
+              </a:rPr>
+              <a:t>dbo:birthDate</a:t>
+            </a:r>
             <a:r>
               <a:rPr lang="en-GB" dirty="0">
                 <a:latin typeface="Century Gothic" panose="020B0502020202020204" pitchFamily="34" charset="0"/>
               </a:rPr>
-              <a:t>WHERE</a:t>
-            </a:r>
-          </a:p>
-          <a:p>
+              <a:t> ?dob; </a:t>
+            </a:r>
+            <a:r>
+              <a:rPr lang="en-GB" dirty="0" err="1">
+                <a:latin typeface="Century Gothic" panose="020B0502020202020204" pitchFamily="34" charset="0"/>
+              </a:rPr>
+              <a:t>dbo:height</a:t>
+            </a:r>
             <a:r>
               <a:rPr lang="en-GB" dirty="0">
                 <a:latin typeface="Century Gothic" panose="020B0502020202020204" pitchFamily="34" charset="0"/>
               </a:rPr>
-              <a:t>{</a:t>
-            </a:r>
-          </a:p>
-          <a:p>
+              <a:t> ?</a:t>
+            </a:r>
+            <a:r>
+              <a:rPr lang="en-GB" dirty="0" err="1">
+                <a:latin typeface="Century Gothic" panose="020B0502020202020204" pitchFamily="34" charset="0"/>
+              </a:rPr>
+              <a:t>ht</a:t>
+            </a:r>
             <a:r>
               <a:rPr lang="en-GB" dirty="0">
                 <a:latin typeface="Century Gothic" panose="020B0502020202020204" pitchFamily="34" charset="0"/>
               </a:rPr>
-              <a:t>?a </a:t>
-            </a:r>
+              <a:t>;</a:t>
+            </a:r>
+          </a:p>
+          <a:p>
             <a:r>
               <a:rPr lang="en-GB" dirty="0" err="1">
                 <a:latin typeface="Century Gothic" panose="020B0502020202020204" pitchFamily="34" charset="0"/>
               </a:rPr>
-              <a:t>a</a:t>
+              <a:t>foaf:name</a:t>
             </a:r>
             <a:r>
               <a:rPr lang="en-GB" dirty="0">
                 <a:latin typeface="Century Gothic" panose="020B0502020202020204" pitchFamily="34" charset="0"/>
               </a:rPr>
-              <a:t> </a:t>
+              <a:t> ?name; </a:t>
             </a:r>
             <a:r>
               <a:rPr lang="en-GB" dirty="0" err="1">
                 <a:latin typeface="Century Gothic" panose="020B0502020202020204" pitchFamily="34" charset="0"/>
               </a:rPr>
-              <a:t>dbo:Athlete</a:t>
+              <a:t>dbo:abstract</a:t>
             </a:r>
             <a:r>
               <a:rPr lang="en-GB" dirty="0">
                 <a:latin typeface="Century Gothic" panose="020B0502020202020204" pitchFamily="34" charset="0"/>
               </a:rPr>
-              <a:t>; </a:t>
+              <a:t> ?intro.</a:t>
+            </a:r>
+          </a:p>
+          <a:p>
+            <a:r>
+              <a:rPr lang="en-GB" dirty="0">
+                <a:latin typeface="Century Gothic" panose="020B0502020202020204" pitchFamily="34" charset="0"/>
+              </a:rPr>
+              <a:t>OPTIONAL{?a  </a:t>
             </a:r>
             <a:r>
               <a:rPr lang="en-GB" dirty="0" err="1">
                 <a:latin typeface="Century Gothic" panose="020B0502020202020204" pitchFamily="34" charset="0"/>
               </a:rPr>
-              <a:t>dbo:birthDate</a:t>
+              <a:t>dbo:country</a:t>
             </a:r>
             <a:r>
               <a:rPr lang="en-GB" dirty="0">
                 <a:latin typeface="Century Gothic" panose="020B0502020202020204" pitchFamily="34" charset="0"/>
               </a:rPr>
-              <a:t> ?dob; </a:t>
+              <a:t> ?c}</a:t>
+            </a:r>
+          </a:p>
+          <a:p>
+            <a:r>
+              <a:rPr lang="en-GB" dirty="0">
+                <a:latin typeface="Century Gothic" panose="020B0502020202020204" pitchFamily="34" charset="0"/>
+              </a:rPr>
+              <a:t>FILTER(LANG(?name) = "</a:t>
             </a:r>
             <a:r>
               <a:rPr lang="en-GB" dirty="0" err="1">
                 <a:latin typeface="Century Gothic" panose="020B0502020202020204" pitchFamily="34" charset="0"/>
               </a:rPr>
-              <a:t>dbo:height</a:t>
+              <a:t>en</a:t>
             </a:r>
             <a:r>
               <a:rPr lang="en-GB" dirty="0">
                 <a:latin typeface="Century Gothic" panose="020B0502020202020204" pitchFamily="34" charset="0"/>
               </a:rPr>
-              <a:t> ?</a:t>
-            </a:r>
-            <a:r>
-              <a:rPr lang="en-GB" dirty="0" err="1">
-                <a:latin typeface="Century Gothic" panose="020B0502020202020204" pitchFamily="34" charset="0"/>
-              </a:rPr>
-              <a:t>ht</a:t>
-            </a:r>
+              <a:t>").</a:t>
+            </a:r>
+          </a:p>
+          <a:p>
             <a:r>
               <a:rPr lang="en-GB" dirty="0">
                 <a:latin typeface="Century Gothic" panose="020B0502020202020204" pitchFamily="34" charset="0"/>
               </a:rPr>
-              <a:t>;</a:t>
-            </a:r>
-          </a:p>
-          <a:p>
-            <a:r>
-              <a:rPr lang="en-GB" dirty="0" err="1">
-                <a:latin typeface="Century Gothic" panose="020B0502020202020204" pitchFamily="34" charset="0"/>
-              </a:rPr>
-              <a:t>ling:hypernym</a:t>
-            </a:r>
+              <a:t>} </a:t>
+            </a:r>
+          </a:p>
+          <a:p>
             <a:r>
               <a:rPr lang="en-GB" dirty="0">
                 <a:latin typeface="Century Gothic" panose="020B0502020202020204" pitchFamily="34" charset="0"/>
               </a:rPr>
-              <a:t> ?</a:t>
-            </a:r>
-            <a:r>
-              <a:rPr lang="en-GB" dirty="0" err="1">
-                <a:latin typeface="Century Gothic" panose="020B0502020202020204" pitchFamily="34" charset="0"/>
-              </a:rPr>
-              <a:t>hpn</a:t>
-            </a:r>
-            <a:r>
-              <a:rPr lang="en-GB" dirty="0">
-                <a:latin typeface="Century Gothic" panose="020B0502020202020204" pitchFamily="34" charset="0"/>
-              </a:rPr>
-              <a:t>; </a:t>
-            </a:r>
-            <a:r>
-              <a:rPr lang="en-GB" dirty="0" err="1">
-                <a:latin typeface="Century Gothic" panose="020B0502020202020204" pitchFamily="34" charset="0"/>
-              </a:rPr>
-              <a:t>foaf:gender</a:t>
-            </a:r>
-            <a:r>
-              <a:rPr lang="en-GB" dirty="0">
-                <a:latin typeface="Century Gothic" panose="020B0502020202020204" pitchFamily="34" charset="0"/>
-              </a:rPr>
-              <a:t> ?g; </a:t>
-            </a:r>
-            <a:r>
-              <a:rPr lang="en-GB" dirty="0" err="1">
-                <a:latin typeface="Century Gothic" panose="020B0502020202020204" pitchFamily="34" charset="0"/>
-              </a:rPr>
-              <a:t>foaf:name</a:t>
-            </a:r>
-            <a:r>
-              <a:rPr lang="en-GB" dirty="0">
-                <a:latin typeface="Century Gothic" panose="020B0502020202020204" pitchFamily="34" charset="0"/>
-              </a:rPr>
-              <a:t> ?name; </a:t>
-            </a:r>
-            <a:r>
-              <a:rPr lang="en-GB" dirty="0" err="1">
-                <a:latin typeface="Century Gothic" panose="020B0502020202020204" pitchFamily="34" charset="0"/>
-              </a:rPr>
-              <a:t>dbo:abstract</a:t>
-            </a:r>
-            <a:r>
-              <a:rPr lang="en-GB" dirty="0">
-                <a:latin typeface="Century Gothic" panose="020B0502020202020204" pitchFamily="34" charset="0"/>
-              </a:rPr>
-              <a:t> ?intro.</a:t>
-            </a:r>
-          </a:p>
-          <a:p>
-            <a:r>
-              <a:rPr lang="en-GB" b="1" dirty="0">
-                <a:latin typeface="Century Gothic" panose="020B0502020202020204" pitchFamily="34" charset="0"/>
-              </a:rPr>
-              <a:t>OPTIONAL</a:t>
-            </a:r>
-            <a:r>
-              <a:rPr lang="en-GB" dirty="0">
-                <a:latin typeface="Century Gothic" panose="020B0502020202020204" pitchFamily="34" charset="0"/>
-              </a:rPr>
-              <a:t>{?a  </a:t>
-            </a:r>
-            <a:r>
-              <a:rPr lang="en-GB" dirty="0" err="1">
-                <a:latin typeface="Century Gothic" panose="020B0502020202020204" pitchFamily="34" charset="0"/>
-              </a:rPr>
-              <a:t>dbo:country</a:t>
-            </a:r>
-            <a:r>
-              <a:rPr lang="en-GB" dirty="0">
-                <a:latin typeface="Century Gothic" panose="020B0502020202020204" pitchFamily="34" charset="0"/>
-              </a:rPr>
-              <a:t> ?c}</a:t>
-            </a:r>
-          </a:p>
-          <a:p>
-            <a:r>
-              <a:rPr lang="en-GB" b="1" dirty="0">
-                <a:latin typeface="Century Gothic" panose="020B0502020202020204" pitchFamily="34" charset="0"/>
-              </a:rPr>
-              <a:t>FILTER</a:t>
-            </a:r>
-            <a:r>
-              <a:rPr lang="en-GB" dirty="0">
-                <a:latin typeface="Century Gothic" panose="020B0502020202020204" pitchFamily="34" charset="0"/>
-              </a:rPr>
-              <a:t>(LANG(?name) = "</a:t>
-            </a:r>
-            <a:r>
-              <a:rPr lang="en-GB" dirty="0" err="1">
-                <a:latin typeface="Century Gothic" panose="020B0502020202020204" pitchFamily="34" charset="0"/>
-              </a:rPr>
-              <a:t>en</a:t>
-            </a:r>
-            <a:r>
-              <a:rPr lang="en-GB" dirty="0">
-                <a:latin typeface="Century Gothic" panose="020B0502020202020204" pitchFamily="34" charset="0"/>
-              </a:rPr>
-              <a:t>").</a:t>
-            </a:r>
-          </a:p>
-          <a:p>
-            <a:r>
-              <a:rPr lang="en-GB" dirty="0">
-                <a:latin typeface="Century Gothic" panose="020B0502020202020204" pitchFamily="34" charset="0"/>
-              </a:rPr>
-              <a:t>} </a:t>
-            </a:r>
-          </a:p>
-          <a:p>
-            <a:r>
-              <a:rPr lang="en-GB" b="1" dirty="0">
-                <a:latin typeface="Century Gothic" panose="020B0502020202020204" pitchFamily="34" charset="0"/>
-              </a:rPr>
-              <a:t>LIMIT</a:t>
-            </a:r>
-            <a:r>
-              <a:rPr lang="en-GB" dirty="0">
-                <a:latin typeface="Century Gothic" panose="020B0502020202020204" pitchFamily="34" charset="0"/>
-              </a:rPr>
-              <a:t> 10000 </a:t>
-            </a:r>
-            <a:r>
-              <a:rPr lang="en-GB" b="1" dirty="0">
-                <a:latin typeface="Century Gothic" panose="020B0502020202020204" pitchFamily="34" charset="0"/>
-              </a:rPr>
-              <a:t>OFFSET</a:t>
-            </a:r>
-            <a:r>
-              <a:rPr lang="en-GB" dirty="0">
-                <a:latin typeface="Century Gothic" panose="020B0502020202020204" pitchFamily="34" charset="0"/>
-              </a:rPr>
-              <a:t> 0</a:t>
+              <a:t>LIMIT 10000 OFFSET 0</a:t>
             </a:r>
           </a:p>
         </p:txBody>
       </p:sp>
-      <p:sp>
-        <p:nvSpPr>
-          <p:cNvPr id="25" name="TextBox 24">
-            <a:extLst>
-              <a:ext uri="{FF2B5EF4-FFF2-40B4-BE49-F238E27FC236}">
-                <a16:creationId xmlns:a16="http://schemas.microsoft.com/office/drawing/2014/main" id="{4CCE93C3-56EF-405A-BF5D-D44F38F7EBCB}"/>
-              </a:ext>
-            </a:extLst>
-          </p:cNvPr>
-          <p:cNvSpPr txBox="1"/>
-          <p:nvPr/>
-        </p:nvSpPr>
-        <p:spPr>
-          <a:xfrm>
-            <a:off x="4018096" y="1950752"/>
-            <a:ext cx="6103398" cy="3970318"/>
-          </a:xfrm>
-          <a:prstGeom prst="rect">
-            <a:avLst/>
-          </a:prstGeom>
-          <a:noFill/>
-        </p:spPr>
-        <p:txBody>
-          <a:bodyPr wrap="square">
-            <a:spAutoFit/>
-          </a:bodyPr>
-          <a:lstStyle/>
-          <a:p>
-            <a:r>
-              <a:rPr lang="en-GB" dirty="0">
-                <a:latin typeface="Century Gothic" panose="020B0502020202020204" pitchFamily="34" charset="0"/>
-              </a:rPr>
-              <a:t>PREFIX </a:t>
-            </a:r>
-            <a:r>
-              <a:rPr lang="en-GB" dirty="0" err="1">
-                <a:latin typeface="Century Gothic" panose="020B0502020202020204" pitchFamily="34" charset="0"/>
-              </a:rPr>
-              <a:t>foaf</a:t>
-            </a:r>
-            <a:r>
-              <a:rPr lang="en-GB" dirty="0">
-                <a:latin typeface="Century Gothic" panose="020B0502020202020204" pitchFamily="34" charset="0"/>
-              </a:rPr>
-              <a:t>: &lt;http://xmlns.com/foaf/0.1/&gt;</a:t>
-            </a:r>
-          </a:p>
-          <a:p>
-            <a:r>
-              <a:rPr lang="en-GB" dirty="0">
-                <a:latin typeface="Century Gothic" panose="020B0502020202020204" pitchFamily="34" charset="0"/>
-              </a:rPr>
-              <a:t>PREFIX </a:t>
-            </a:r>
-            <a:r>
-              <a:rPr lang="en-GB" dirty="0" err="1">
-                <a:latin typeface="Century Gothic" panose="020B0502020202020204" pitchFamily="34" charset="0"/>
-              </a:rPr>
-              <a:t>dbo</a:t>
-            </a:r>
-            <a:r>
-              <a:rPr lang="en-GB" dirty="0">
-                <a:latin typeface="Century Gothic" panose="020B0502020202020204" pitchFamily="34" charset="0"/>
-              </a:rPr>
-              <a:t>: &lt;http://dbpedia.org/ontology/&gt;</a:t>
-            </a:r>
-          </a:p>
-          <a:p>
-            <a:r>
-              <a:rPr lang="en-GB" dirty="0">
-                <a:latin typeface="Century Gothic" panose="020B0502020202020204" pitchFamily="34" charset="0"/>
-              </a:rPr>
-              <a:t>PREFIX </a:t>
-            </a:r>
-            <a:r>
-              <a:rPr lang="en-GB" dirty="0" err="1">
-                <a:latin typeface="Century Gothic" panose="020B0502020202020204" pitchFamily="34" charset="0"/>
-              </a:rPr>
-              <a:t>dbr</a:t>
-            </a:r>
-            <a:r>
-              <a:rPr lang="en-GB" dirty="0">
-                <a:latin typeface="Century Gothic" panose="020B0502020202020204" pitchFamily="34" charset="0"/>
-              </a:rPr>
-              <a:t>: &lt;http://dbpedia.org/resource/&gt;</a:t>
-            </a:r>
-          </a:p>
-          <a:p>
-            <a:r>
-              <a:rPr lang="en-GB" dirty="0">
-                <a:latin typeface="Century Gothic" panose="020B0502020202020204" pitchFamily="34" charset="0"/>
-              </a:rPr>
-              <a:t>PREFIX </a:t>
-            </a:r>
-            <a:r>
-              <a:rPr lang="en-GB" dirty="0" err="1">
-                <a:latin typeface="Century Gothic" panose="020B0502020202020204" pitchFamily="34" charset="0"/>
-              </a:rPr>
-              <a:t>dbp</a:t>
-            </a:r>
-            <a:r>
-              <a:rPr lang="en-GB" dirty="0">
-                <a:latin typeface="Century Gothic" panose="020B0502020202020204" pitchFamily="34" charset="0"/>
-              </a:rPr>
-              <a:t>: &lt;http://dbpedia.org/property/&gt;</a:t>
-            </a:r>
-          </a:p>
-          <a:p>
-            <a:r>
-              <a:rPr lang="en-GB" dirty="0">
-                <a:latin typeface="Century Gothic" panose="020B0502020202020204" pitchFamily="34" charset="0"/>
-              </a:rPr>
-              <a:t>SELECT DISTINCT ?a, ?dob, ?</a:t>
-            </a:r>
-            <a:r>
-              <a:rPr lang="en-GB" dirty="0" err="1">
-                <a:latin typeface="Century Gothic" panose="020B0502020202020204" pitchFamily="34" charset="0"/>
-              </a:rPr>
-              <a:t>ht</a:t>
-            </a:r>
-            <a:r>
-              <a:rPr lang="en-GB" dirty="0">
-                <a:latin typeface="Century Gothic" panose="020B0502020202020204" pitchFamily="34" charset="0"/>
-              </a:rPr>
-              <a:t>, ?name, ?c, ?intro</a:t>
-            </a:r>
-          </a:p>
-          <a:p>
-            <a:r>
-              <a:rPr lang="en-GB" dirty="0">
-                <a:latin typeface="Century Gothic" panose="020B0502020202020204" pitchFamily="34" charset="0"/>
-              </a:rPr>
-              <a:t>WHERE</a:t>
-            </a:r>
-          </a:p>
-          <a:p>
-            <a:r>
-              <a:rPr lang="en-GB" dirty="0">
-                <a:latin typeface="Century Gothic" panose="020B0502020202020204" pitchFamily="34" charset="0"/>
-              </a:rPr>
-              <a:t>{</a:t>
-            </a:r>
-          </a:p>
-          <a:p>
-            <a:r>
-              <a:rPr lang="en-GB" dirty="0">
-                <a:latin typeface="Century Gothic" panose="020B0502020202020204" pitchFamily="34" charset="0"/>
-              </a:rPr>
-              <a:t>?a </a:t>
-            </a:r>
-            <a:r>
-              <a:rPr lang="en-GB" dirty="0" err="1">
-                <a:latin typeface="Century Gothic" panose="020B0502020202020204" pitchFamily="34" charset="0"/>
-              </a:rPr>
-              <a:t>a</a:t>
-            </a:r>
-            <a:r>
-              <a:rPr lang="en-GB" dirty="0">
-                <a:latin typeface="Century Gothic" panose="020B0502020202020204" pitchFamily="34" charset="0"/>
-              </a:rPr>
-              <a:t> </a:t>
-            </a:r>
-            <a:r>
-              <a:rPr lang="en-GB" dirty="0" err="1">
-                <a:latin typeface="Century Gothic" panose="020B0502020202020204" pitchFamily="34" charset="0"/>
-              </a:rPr>
-              <a:t>dbo:Athlete</a:t>
-            </a:r>
-            <a:r>
-              <a:rPr lang="en-GB" dirty="0">
-                <a:latin typeface="Century Gothic" panose="020B0502020202020204" pitchFamily="34" charset="0"/>
-              </a:rPr>
-              <a:t>; </a:t>
-            </a:r>
-            <a:r>
-              <a:rPr lang="en-GB" dirty="0" err="1">
-                <a:latin typeface="Century Gothic" panose="020B0502020202020204" pitchFamily="34" charset="0"/>
-              </a:rPr>
-              <a:t>dbo:birthDate</a:t>
-            </a:r>
-            <a:r>
-              <a:rPr lang="en-GB" dirty="0">
-                <a:latin typeface="Century Gothic" panose="020B0502020202020204" pitchFamily="34" charset="0"/>
-              </a:rPr>
-              <a:t> ?dob; </a:t>
-            </a:r>
-            <a:r>
-              <a:rPr lang="en-GB" dirty="0" err="1">
-                <a:latin typeface="Century Gothic" panose="020B0502020202020204" pitchFamily="34" charset="0"/>
-              </a:rPr>
-              <a:t>dbo:height</a:t>
-            </a:r>
-            <a:r>
-              <a:rPr lang="en-GB" dirty="0">
-                <a:latin typeface="Century Gothic" panose="020B0502020202020204" pitchFamily="34" charset="0"/>
-              </a:rPr>
-              <a:t> ?</a:t>
-            </a:r>
-            <a:r>
-              <a:rPr lang="en-GB" dirty="0" err="1">
-                <a:latin typeface="Century Gothic" panose="020B0502020202020204" pitchFamily="34" charset="0"/>
-              </a:rPr>
-              <a:t>ht</a:t>
-            </a:r>
-            <a:r>
-              <a:rPr lang="en-GB" dirty="0">
-                <a:latin typeface="Century Gothic" panose="020B0502020202020204" pitchFamily="34" charset="0"/>
-              </a:rPr>
-              <a:t>;</a:t>
-            </a:r>
-          </a:p>
-          <a:p>
-            <a:r>
-              <a:rPr lang="en-GB" dirty="0" err="1">
-                <a:latin typeface="Century Gothic" panose="020B0502020202020204" pitchFamily="34" charset="0"/>
-              </a:rPr>
-              <a:t>foaf:name</a:t>
-            </a:r>
-            <a:r>
-              <a:rPr lang="en-GB" dirty="0">
-                <a:latin typeface="Century Gothic" panose="020B0502020202020204" pitchFamily="34" charset="0"/>
-              </a:rPr>
-              <a:t> ?name; </a:t>
-            </a:r>
-            <a:r>
-              <a:rPr lang="en-GB" dirty="0" err="1">
-                <a:latin typeface="Century Gothic" panose="020B0502020202020204" pitchFamily="34" charset="0"/>
-              </a:rPr>
-              <a:t>dbo:abstract</a:t>
-            </a:r>
-            <a:r>
-              <a:rPr lang="en-GB" dirty="0">
-                <a:latin typeface="Century Gothic" panose="020B0502020202020204" pitchFamily="34" charset="0"/>
-              </a:rPr>
-              <a:t> ?intro.</a:t>
-            </a:r>
-          </a:p>
-          <a:p>
-            <a:r>
-              <a:rPr lang="en-GB" dirty="0">
-                <a:latin typeface="Century Gothic" panose="020B0502020202020204" pitchFamily="34" charset="0"/>
-              </a:rPr>
-              <a:t>OPTIONAL{?a  </a:t>
-            </a:r>
-            <a:r>
-              <a:rPr lang="en-GB" dirty="0" err="1">
-                <a:latin typeface="Century Gothic" panose="020B0502020202020204" pitchFamily="34" charset="0"/>
-              </a:rPr>
-              <a:t>dbo:country</a:t>
-            </a:r>
-            <a:r>
-              <a:rPr lang="en-GB" dirty="0">
-                <a:latin typeface="Century Gothic" panose="020B0502020202020204" pitchFamily="34" charset="0"/>
-              </a:rPr>
-              <a:t> ?c}</a:t>
-            </a:r>
-          </a:p>
-          <a:p>
-            <a:r>
-              <a:rPr lang="en-GB" dirty="0">
-                <a:latin typeface="Century Gothic" panose="020B0502020202020204" pitchFamily="34" charset="0"/>
-              </a:rPr>
-              <a:t>FILTER(LANG(?name) = "</a:t>
-            </a:r>
-            <a:r>
-              <a:rPr lang="en-GB" dirty="0" err="1">
-                <a:latin typeface="Century Gothic" panose="020B0502020202020204" pitchFamily="34" charset="0"/>
-              </a:rPr>
-              <a:t>en</a:t>
-            </a:r>
-            <a:r>
-              <a:rPr lang="en-GB" dirty="0">
-                <a:latin typeface="Century Gothic" panose="020B0502020202020204" pitchFamily="34" charset="0"/>
-              </a:rPr>
-              <a:t>").</a:t>
-            </a:r>
-          </a:p>
-          <a:p>
-            <a:r>
-              <a:rPr lang="en-GB" dirty="0">
-                <a:latin typeface="Century Gothic" panose="020B0502020202020204" pitchFamily="34" charset="0"/>
-              </a:rPr>
-              <a:t>} </a:t>
-            </a:r>
-          </a:p>
-          <a:p>
-            <a:r>
-              <a:rPr lang="en-GB" dirty="0">
-                <a:latin typeface="Century Gothic" panose="020B0502020202020204" pitchFamily="34" charset="0"/>
-              </a:rPr>
-              <a:t>LIMIT 10000 OFFSET 0</a:t>
-            </a:r>
-          </a:p>
-        </p:txBody>
-      </p:sp>
-      <p:cxnSp>
-        <p:nvCxnSpPr>
-          <p:cNvPr id="27" name="Straight Connector 26">
-            <a:extLst>
-              <a:ext uri="{FF2B5EF4-FFF2-40B4-BE49-F238E27FC236}">
-                <a16:creationId xmlns:a16="http://schemas.microsoft.com/office/drawing/2014/main" id="{079C7CBA-EF34-49B3-8482-6787255DD926}"/>
-              </a:ext>
-            </a:extLst>
-          </p:cNvPr>
-          <p:cNvCxnSpPr>
-            <a:cxnSpLocks/>
-          </p:cNvCxnSpPr>
-          <p:nvPr/>
-        </p:nvCxnSpPr>
-        <p:spPr>
-          <a:xfrm flipH="1">
-            <a:off x="4927879" y="4735053"/>
-            <a:ext cx="3968316" cy="0"/>
-          </a:xfrm>
-          <a:prstGeom prst="line">
-            <a:avLst/>
-          </a:prstGeom>
-        </p:spPr>
-        <p:style>
-          <a:lnRef idx="2">
-            <a:schemeClr val="dk1"/>
-          </a:lnRef>
-          <a:fillRef idx="0">
-            <a:schemeClr val="dk1"/>
-          </a:fillRef>
-          <a:effectRef idx="1">
-            <a:schemeClr val="dk1"/>
-          </a:effectRef>
-          <a:fontRef idx="minor">
-            <a:schemeClr val="tx1"/>
-          </a:fontRef>
-        </p:style>
-      </p:cxnSp>
       <p:pic>
         <p:nvPicPr>
           <p:cNvPr id="11" name="Picture 10" descr="A picture containing graphical user interface&#10;&#10;Description automatically generated">
@@ -8034,306 +7603,24 @@
                                   </p:childTnLst>
                                 </p:cTn>
                               </p:par>
+                            </p:childTnLst>
+                          </p:cTn>
+                        </p:par>
+                        <p:par>
+                          <p:cTn id="25" fill="hold">
+                            <p:stCondLst>
+                              <p:cond delay="500"/>
+                            </p:stCondLst>
+                            <p:childTnLst>
                               <p:par>
-                                <p:cTn id="25" presetID="2" presetClass="entr" presetSubtype="4" fill="hold" grpId="0" nodeType="withEffect">
+                                <p:cTn id="26" presetID="2" presetClass="entr" presetSubtype="4" fill="hold" grpId="0" nodeType="afterEffect">
                                   <p:stCondLst>
                                     <p:cond delay="0"/>
                                   </p:stCondLst>
                                   <p:childTnLst>
                                     <p:set>
                                       <p:cBhvr>
-                                        <p:cTn id="26" dur="1" fill="hold">
-                                          <p:stCondLst>
-                                            <p:cond delay="0"/>
-                                          </p:stCondLst>
-                                        </p:cTn>
-                                        <p:tgtEl>
-                                          <p:spTgt spid="23"/>
-                                        </p:tgtEl>
-                                        <p:attrNameLst>
-                                          <p:attrName>style.visibility</p:attrName>
-                                        </p:attrNameLst>
-                                      </p:cBhvr>
-                                      <p:to>
-                                        <p:strVal val="visible"/>
-                                      </p:to>
-                                    </p:set>
-                                    <p:anim calcmode="lin" valueType="num">
-                                      <p:cBhvr additive="base">
-                                        <p:cTn id="27" dur="500" fill="hold"/>
-                                        <p:tgtEl>
-                                          <p:spTgt spid="23"/>
-                                        </p:tgtEl>
-                                        <p:attrNameLst>
-                                          <p:attrName>ppt_x</p:attrName>
-                                        </p:attrNameLst>
-                                      </p:cBhvr>
-                                      <p:tavLst>
-                                        <p:tav tm="0">
-                                          <p:val>
-                                            <p:strVal val="#ppt_x"/>
-                                          </p:val>
-                                        </p:tav>
-                                        <p:tav tm="100000">
-                                          <p:val>
-                                            <p:strVal val="#ppt_x"/>
-                                          </p:val>
-                                        </p:tav>
-                                      </p:tavLst>
-                                    </p:anim>
-                                    <p:anim calcmode="lin" valueType="num">
-                                      <p:cBhvr additive="base">
-                                        <p:cTn id="28" dur="500" fill="hold"/>
-                                        <p:tgtEl>
-                                          <p:spTgt spid="23"/>
-                                        </p:tgtEl>
-                                        <p:attrNameLst>
-                                          <p:attrName>ppt_y</p:attrName>
-                                        </p:attrNameLst>
-                                      </p:cBhvr>
-                                      <p:tavLst>
-                                        <p:tav tm="0">
-                                          <p:val>
-                                            <p:strVal val="1+#ppt_h/2"/>
-                                          </p:val>
-                                        </p:tav>
-                                        <p:tav tm="100000">
-                                          <p:val>
-                                            <p:strVal val="#ppt_y"/>
-                                          </p:val>
-                                        </p:tav>
-                                      </p:tavLst>
-                                    </p:anim>
-                                  </p:childTnLst>
-                                </p:cTn>
-                              </p:par>
-                            </p:childTnLst>
-                          </p:cTn>
-                        </p:par>
-                      </p:childTnLst>
-                    </p:cTn>
-                  </p:par>
-                  <p:par>
-                    <p:cTn id="29" fill="hold">
-                      <p:stCondLst>
-                        <p:cond delay="indefinite"/>
-                      </p:stCondLst>
-                      <p:childTnLst>
-                        <p:par>
-                          <p:cTn id="30" fill="hold">
-                            <p:stCondLst>
-                              <p:cond delay="0"/>
-                            </p:stCondLst>
-                            <p:childTnLst>
-                              <p:par>
-                                <p:cTn id="31" presetID="1" presetClass="entr" presetSubtype="0" fill="hold" nodeType="clickEffect">
-                                  <p:stCondLst>
-                                    <p:cond delay="0"/>
-                                  </p:stCondLst>
-                                  <p:childTnLst>
-                                    <p:set>
-                                      <p:cBhvr>
-                                        <p:cTn id="32" dur="1" fill="hold">
-                                          <p:stCondLst>
-                                            <p:cond delay="0"/>
-                                          </p:stCondLst>
-                                        </p:cTn>
-                                        <p:tgtEl>
-                                          <p:spTgt spid="27"/>
-                                        </p:tgtEl>
-                                        <p:attrNameLst>
-                                          <p:attrName>style.visibility</p:attrName>
-                                        </p:attrNameLst>
-                                      </p:cBhvr>
-                                      <p:to>
-                                        <p:strVal val="visible"/>
-                                      </p:to>
-                                    </p:set>
-                                  </p:childTnLst>
-                                </p:cTn>
-                              </p:par>
-                            </p:childTnLst>
-                          </p:cTn>
-                        </p:par>
-                      </p:childTnLst>
-                    </p:cTn>
-                  </p:par>
-                  <p:par>
-                    <p:cTn id="33" fill="hold">
-                      <p:stCondLst>
-                        <p:cond delay="indefinite"/>
-                      </p:stCondLst>
-                      <p:childTnLst>
-                        <p:par>
-                          <p:cTn id="34" fill="hold">
-                            <p:stCondLst>
-                              <p:cond delay="0"/>
-                            </p:stCondLst>
-                            <p:childTnLst>
-                              <p:par>
-                                <p:cTn id="35" presetID="2" presetClass="exit" presetSubtype="8" fill="hold" grpId="1" nodeType="clickEffect">
-                                  <p:stCondLst>
-                                    <p:cond delay="0"/>
-                                  </p:stCondLst>
-                                  <p:childTnLst>
-                                    <p:anim calcmode="lin" valueType="num">
-                                      <p:cBhvr additive="base">
-                                        <p:cTn id="36" dur="500"/>
-                                        <p:tgtEl>
-                                          <p:spTgt spid="23"/>
-                                        </p:tgtEl>
-                                        <p:attrNameLst>
-                                          <p:attrName>ppt_x</p:attrName>
-                                        </p:attrNameLst>
-                                      </p:cBhvr>
-                                      <p:tavLst>
-                                        <p:tav tm="0">
-                                          <p:val>
-                                            <p:strVal val="ppt_x"/>
-                                          </p:val>
-                                        </p:tav>
-                                        <p:tav tm="100000">
-                                          <p:val>
-                                            <p:strVal val="0-ppt_w/2"/>
-                                          </p:val>
-                                        </p:tav>
-                                      </p:tavLst>
-                                    </p:anim>
-                                    <p:anim calcmode="lin" valueType="num">
-                                      <p:cBhvr additive="base">
-                                        <p:cTn id="37" dur="500"/>
-                                        <p:tgtEl>
-                                          <p:spTgt spid="23"/>
-                                        </p:tgtEl>
-                                        <p:attrNameLst>
-                                          <p:attrName>ppt_y</p:attrName>
-                                        </p:attrNameLst>
-                                      </p:cBhvr>
-                                      <p:tavLst>
-                                        <p:tav tm="0">
-                                          <p:val>
-                                            <p:strVal val="ppt_y"/>
-                                          </p:val>
-                                        </p:tav>
-                                        <p:tav tm="100000">
-                                          <p:val>
-                                            <p:strVal val="ppt_y"/>
-                                          </p:val>
-                                        </p:tav>
-                                      </p:tavLst>
-                                    </p:anim>
-                                    <p:set>
-                                      <p:cBhvr>
-                                        <p:cTn id="38" dur="1" fill="hold">
-                                          <p:stCondLst>
-                                            <p:cond delay="499"/>
-                                          </p:stCondLst>
-                                        </p:cTn>
-                                        <p:tgtEl>
-                                          <p:spTgt spid="23"/>
-                                        </p:tgtEl>
-                                        <p:attrNameLst>
-                                          <p:attrName>style.visibility</p:attrName>
-                                        </p:attrNameLst>
-                                      </p:cBhvr>
-                                      <p:to>
-                                        <p:strVal val="hidden"/>
-                                      </p:to>
-                                    </p:set>
-                                  </p:childTnLst>
-                                </p:cTn>
-                              </p:par>
-                              <p:par>
-                                <p:cTn id="39" presetID="2" presetClass="exit" presetSubtype="8" fill="hold" nodeType="withEffect">
-                                  <p:stCondLst>
-                                    <p:cond delay="0"/>
-                                  </p:stCondLst>
-                                  <p:childTnLst>
-                                    <p:anim calcmode="lin" valueType="num">
-                                      <p:cBhvr additive="base">
-                                        <p:cTn id="40" dur="500"/>
-                                        <p:tgtEl>
-                                          <p:spTgt spid="27"/>
-                                        </p:tgtEl>
-                                        <p:attrNameLst>
-                                          <p:attrName>ppt_x</p:attrName>
-                                        </p:attrNameLst>
-                                      </p:cBhvr>
-                                      <p:tavLst>
-                                        <p:tav tm="0">
-                                          <p:val>
-                                            <p:strVal val="ppt_x"/>
-                                          </p:val>
-                                        </p:tav>
-                                        <p:tav tm="100000">
-                                          <p:val>
-                                            <p:strVal val="0-ppt_w/2"/>
-                                          </p:val>
-                                        </p:tav>
-                                      </p:tavLst>
-                                    </p:anim>
-                                    <p:anim calcmode="lin" valueType="num">
-                                      <p:cBhvr additive="base">
-                                        <p:cTn id="41" dur="500"/>
-                                        <p:tgtEl>
-                                          <p:spTgt spid="27"/>
-                                        </p:tgtEl>
-                                        <p:attrNameLst>
-                                          <p:attrName>ppt_y</p:attrName>
-                                        </p:attrNameLst>
-                                      </p:cBhvr>
-                                      <p:tavLst>
-                                        <p:tav tm="0">
-                                          <p:val>
-                                            <p:strVal val="ppt_y"/>
-                                          </p:val>
-                                        </p:tav>
-                                        <p:tav tm="100000">
-                                          <p:val>
-                                            <p:strVal val="ppt_y"/>
-                                          </p:val>
-                                        </p:tav>
-                                      </p:tavLst>
-                                    </p:anim>
-                                    <p:set>
-                                      <p:cBhvr>
-                                        <p:cTn id="42" dur="1" fill="hold">
-                                          <p:stCondLst>
-                                            <p:cond delay="499"/>
-                                          </p:stCondLst>
-                                        </p:cTn>
-                                        <p:tgtEl>
-                                          <p:spTgt spid="27"/>
-                                        </p:tgtEl>
-                                        <p:attrNameLst>
-                                          <p:attrName>style.visibility</p:attrName>
-                                        </p:attrNameLst>
-                                      </p:cBhvr>
-                                      <p:to>
-                                        <p:strVal val="hidden"/>
-                                      </p:to>
-                                    </p:set>
-                                  </p:childTnLst>
-                                </p:cTn>
-                              </p:par>
-                            </p:childTnLst>
-                          </p:cTn>
-                        </p:par>
-                        <p:par>
-                          <p:cTn id="43" fill="hold">
-                            <p:stCondLst>
-                              <p:cond delay="500"/>
-                            </p:stCondLst>
-                            <p:childTnLst>
-                              <p:par>
-                                <p:cTn id="44" presetID="2" presetClass="entr" presetSubtype="4" fill="hold" grpId="0" nodeType="afterEffect">
-                                  <p:stCondLst>
-                                    <p:cond delay="0"/>
-                                  </p:stCondLst>
-                                  <p:childTnLst>
-                                    <p:set>
-                                      <p:cBhvr>
-                                        <p:cTn id="45" dur="1" fill="hold">
+                                        <p:cTn id="27" dur="1" fill="hold">
                                           <p:stCondLst>
                                             <p:cond delay="0"/>
                                           </p:stCondLst>
@@ -8351,7 +7638,7 @@
                                     </p:set>
                                     <p:anim calcmode="lin" valueType="num">
                                       <p:cBhvr additive="base">
-                                        <p:cTn id="46" dur="500" fill="hold"/>
+                                        <p:cTn id="28" dur="500" fill="hold"/>
                                         <p:tgtEl>
                                           <p:spTgt spid="25"/>
                                         </p:tgtEl>
@@ -8374,7 +7661,7 @@
                                     </p:anim>
                                     <p:anim calcmode="lin" valueType="num">
                                       <p:cBhvr additive="base">
-                                        <p:cTn id="47" dur="500" fill="hold"/>
+                                        <p:cTn id="29" dur="500" fill="hold"/>
                                         <p:tgtEl>
                                           <p:spTgt spid="25"/>
                                         </p:tgtEl>
@@ -8430,8 +7717,6 @@
       <p:bldP spid="5" grpId="1"/>
       <p:bldP spid="19" grpId="0"/>
       <p:bldP spid="19" grpId="1"/>
-      <p:bldP spid="23" grpId="0"/>
-      <p:bldP spid="23" grpId="1"/>
       <p:bldP spid="25" grpId="0"/>
     </p:bldLst>
   </p:timing>
@@ -10612,6 +9897,14 @@
 <file path=ppt/slides/slide5.xml><?xml version="1.0" encoding="utf-8"?>
 <p:sld xmlns:a="http://schemas.openxmlformats.org/drawingml/2006/main" xmlns:r="http://schemas.openxmlformats.org/officeDocument/2006/relationships" xmlns:p="http://schemas.openxmlformats.org/presentationml/2006/main">
   <p:cSld>
+    <p:bg>
+      <p:bgPr>
+        <a:solidFill>
+          <a:schemeClr val="bg1"/>
+        </a:solidFill>
+        <a:effectLst/>
+      </p:bgPr>
+    </p:bg>
     <p:spTree>
       <p:nvGrpSpPr>
         <p:cNvPr id="1" name=""/>
@@ -10626,12 +9919,112 @@
           <a:chExt cx="0" cy="0"/>
         </a:xfrm>
       </p:grpSpPr>
+      <p:sp>
+        <p:nvSpPr>
+          <p:cNvPr id="4" name="Rectangle 3">
+            <a:extLst>
+              <a:ext uri="{FF2B5EF4-FFF2-40B4-BE49-F238E27FC236}">
+                <a16:creationId xmlns:a16="http://schemas.microsoft.com/office/drawing/2014/main" id="{70804784-4D7E-4E3E-8101-B343AAE608EA}"/>
+              </a:ext>
+            </a:extLst>
+          </p:cNvPr>
+          <p:cNvSpPr/>
+          <p:nvPr/>
+        </p:nvSpPr>
+        <p:spPr>
+          <a:xfrm>
+            <a:off x="4045527" y="0"/>
+            <a:ext cx="8146473" cy="6858000"/>
+          </a:xfrm>
+          <a:prstGeom prst="rect">
+            <a:avLst/>
+          </a:prstGeom>
+          <a:solidFill>
+            <a:schemeClr val="bg1"/>
+          </a:solidFill>
+          <a:ln>
+            <a:noFill/>
+          </a:ln>
+        </p:spPr>
+        <p:style>
+          <a:lnRef idx="2">
+            <a:schemeClr val="accent1">
+              <a:shade val="50000"/>
+            </a:schemeClr>
+          </a:lnRef>
+          <a:fillRef idx="1">
+            <a:schemeClr val="accent1"/>
+          </a:fillRef>
+          <a:effectRef idx="0">
+            <a:schemeClr val="accent1"/>
+          </a:effectRef>
+          <a:fontRef idx="minor">
+            <a:schemeClr val="lt1"/>
+          </a:fontRef>
+        </p:style>
+        <p:txBody>
+          <a:bodyPr rtlCol="0" anchor="ctr"/>
+          <a:lstStyle/>
+          <a:p>
+            <a:pPr algn="ctr"/>
+            <a:endParaRPr lang="en-GB"/>
+          </a:p>
+        </p:txBody>
+      </p:sp>
+      <p:sp>
+        <p:nvSpPr>
+          <p:cNvPr id="2" name="TextBox 1">
+            <a:extLst>
+              <a:ext uri="{FF2B5EF4-FFF2-40B4-BE49-F238E27FC236}">
+                <a16:creationId xmlns:a16="http://schemas.microsoft.com/office/drawing/2014/main" id="{CA25965A-CD20-4D39-996E-6E0FC4A2643B}"/>
+              </a:ext>
+            </a:extLst>
+          </p:cNvPr>
+          <p:cNvSpPr txBox="1"/>
+          <p:nvPr/>
+        </p:nvSpPr>
+        <p:spPr>
+          <a:xfrm>
+            <a:off x="808450" y="2470758"/>
+            <a:ext cx="2470548" cy="1754326"/>
+          </a:xfrm>
+          <a:prstGeom prst="rect">
+            <a:avLst/>
+          </a:prstGeom>
+          <a:noFill/>
+        </p:spPr>
+        <p:txBody>
+          <a:bodyPr wrap="none" rtlCol="0">
+            <a:spAutoFit/>
+          </a:bodyPr>
+          <a:lstStyle/>
+          <a:p>
+            <a:r>
+              <a:rPr lang="en-GB" sz="5400" b="1" dirty="0">
+                <a:latin typeface="Century Gothic" panose="020B0502020202020204" pitchFamily="34" charset="0"/>
+              </a:rPr>
+              <a:t>LINKED</a:t>
+            </a:r>
+          </a:p>
+          <a:p>
+            <a:r>
+              <a:rPr lang="en-GB" sz="5400" b="1" dirty="0">
+                <a:latin typeface="Century Gothic" panose="020B0502020202020204" pitchFamily="34" charset="0"/>
+              </a:rPr>
+              <a:t>DATA</a:t>
+            </a:r>
+            <a:endParaRPr lang="en-GB" sz="3600" b="1" dirty="0">
+              <a:latin typeface="Century Gothic" panose="020B0502020202020204" pitchFamily="34" charset="0"/>
+            </a:endParaRPr>
+          </a:p>
+        </p:txBody>
+      </p:sp>
       <p:cxnSp>
         <p:nvCxnSpPr>
-          <p:cNvPr id="6" name="Straight Connector 5">
-            <a:extLst>
-              <a:ext uri="{FF2B5EF4-FFF2-40B4-BE49-F238E27FC236}">
-                <a16:creationId xmlns:a16="http://schemas.microsoft.com/office/drawing/2014/main" id="{EE778828-E6A8-4C32-AFA1-4EACFABCA95B}"/>
+          <p:cNvPr id="3" name="Straight Connector 2">
+            <a:extLst>
+              <a:ext uri="{FF2B5EF4-FFF2-40B4-BE49-F238E27FC236}">
+                <a16:creationId xmlns:a16="http://schemas.microsoft.com/office/drawing/2014/main" id="{FAE8FE6B-8962-4A65-9480-07BB6048FE1A}"/>
               </a:ext>
             </a:extLst>
           </p:cNvPr>
@@ -10641,9 +10034,9 @@
           <p:nvPr/>
         </p:nvCxnSpPr>
         <p:spPr>
-          <a:xfrm flipV="1">
-            <a:off x="959371" y="3636550"/>
-            <a:ext cx="2945567" cy="26790"/>
+          <a:xfrm>
+            <a:off x="808450" y="4320288"/>
+            <a:ext cx="2345960" cy="0"/>
           </a:xfrm>
           <a:prstGeom prst="line">
             <a:avLst/>
@@ -10664,108 +10057,12 @@
           </a:fontRef>
         </p:style>
       </p:cxnSp>
-      <p:sp>
-        <p:nvSpPr>
-          <p:cNvPr id="7" name="TextBox 6">
-            <a:extLst>
-              <a:ext uri="{FF2B5EF4-FFF2-40B4-BE49-F238E27FC236}">
-                <a16:creationId xmlns:a16="http://schemas.microsoft.com/office/drawing/2014/main" id="{296DEE2C-E6A1-4E8D-867C-AB85526237D5}"/>
-              </a:ext>
-            </a:extLst>
-          </p:cNvPr>
-          <p:cNvSpPr txBox="1"/>
-          <p:nvPr/>
-        </p:nvSpPr>
-        <p:spPr>
-          <a:xfrm>
-            <a:off x="5470162" y="1484942"/>
-            <a:ext cx="5633804" cy="3888116"/>
-          </a:xfrm>
-          <a:prstGeom prst="rect">
-            <a:avLst/>
-          </a:prstGeom>
-          <a:noFill/>
-        </p:spPr>
-        <p:txBody>
-          <a:bodyPr wrap="square">
-            <a:spAutoFit/>
-          </a:bodyPr>
-          <a:lstStyle/>
-          <a:p>
-            <a:pPr>
-              <a:lnSpc>
-                <a:spcPct val="150000"/>
-              </a:lnSpc>
-            </a:pPr>
-            <a:r>
-              <a:rPr lang="en-GB" sz="2800" dirty="0">
-                <a:latin typeface="Century Gothic" panose="020B0502020202020204" pitchFamily="34" charset="0"/>
-              </a:rPr>
-              <a:t>DBpedia is a </a:t>
-            </a:r>
-            <a:r>
-              <a:rPr lang="en-GB" sz="2800" b="1" dirty="0">
-                <a:latin typeface="Century Gothic" panose="020B0502020202020204" pitchFamily="34" charset="0"/>
-              </a:rPr>
-              <a:t>crowd-sourced</a:t>
-            </a:r>
-            <a:r>
-              <a:rPr lang="en-GB" sz="2800" dirty="0">
-                <a:latin typeface="Century Gothic" panose="020B0502020202020204" pitchFamily="34" charset="0"/>
-              </a:rPr>
-              <a:t> community effort to extract </a:t>
-            </a:r>
-            <a:r>
-              <a:rPr lang="en-GB" sz="2800" b="1" dirty="0">
-                <a:latin typeface="Century Gothic" panose="020B0502020202020204" pitchFamily="34" charset="0"/>
-              </a:rPr>
-              <a:t>structured information </a:t>
-            </a:r>
-            <a:r>
-              <a:rPr lang="en-GB" sz="2800" dirty="0">
-                <a:latin typeface="Century Gothic" panose="020B0502020202020204" pitchFamily="34" charset="0"/>
-              </a:rPr>
-              <a:t>from </a:t>
-            </a:r>
-            <a:r>
-              <a:rPr lang="en-GB" sz="2800" b="1" dirty="0">
-                <a:latin typeface="Century Gothic" panose="020B0502020202020204" pitchFamily="34" charset="0"/>
-              </a:rPr>
-              <a:t>Wikipedia</a:t>
-            </a:r>
-            <a:r>
-              <a:rPr lang="en-GB" sz="2800" dirty="0">
-                <a:latin typeface="Century Gothic" panose="020B0502020202020204" pitchFamily="34" charset="0"/>
-              </a:rPr>
-              <a:t> and make this information available on the </a:t>
-            </a:r>
-            <a:r>
-              <a:rPr lang="en-GB" sz="2800" b="1" dirty="0">
-                <a:latin typeface="Century Gothic" panose="020B0502020202020204" pitchFamily="34" charset="0"/>
-              </a:rPr>
-              <a:t>Web</a:t>
-            </a:r>
-            <a:r>
-              <a:rPr lang="en-GB" sz="2800" dirty="0">
-                <a:latin typeface="Century Gothic" panose="020B0502020202020204" pitchFamily="34" charset="0"/>
-              </a:rPr>
-              <a:t> in the form of </a:t>
-            </a:r>
-            <a:r>
-              <a:rPr lang="en-GB" sz="2800" b="1" dirty="0">
-                <a:latin typeface="Century Gothic" panose="020B0502020202020204" pitchFamily="34" charset="0"/>
-              </a:rPr>
-              <a:t>Linked Data.</a:t>
-            </a:r>
-          </a:p>
-        </p:txBody>
-      </p:sp>
       <p:pic>
         <p:nvPicPr>
-          <p:cNvPr id="3074" name="Picture 2" descr="DBpedia - Wikipedia">
-            <a:extLst>
-              <a:ext uri="{FF2B5EF4-FFF2-40B4-BE49-F238E27FC236}">
-                <a16:creationId xmlns:a16="http://schemas.microsoft.com/office/drawing/2014/main" id="{9503E14A-6A42-48B6-A865-8281C6D72F38}"/>
+          <p:cNvPr id="2050" name="Picture 2" descr="Linking Open Data cloud diagram, by Richard Cyganiak and Anja Jentzsch....  | Download Scientific Diagram">
+            <a:extLst>
+              <a:ext uri="{FF2B5EF4-FFF2-40B4-BE49-F238E27FC236}">
+                <a16:creationId xmlns:a16="http://schemas.microsoft.com/office/drawing/2014/main" id="{BB04F971-917A-49CD-B5B7-B438C5E1FD6D}"/>
               </a:ext>
             </a:extLst>
           </p:cNvPr>
@@ -10789,8 +10086,8 @@
         </p:blipFill>
         <p:spPr bwMode="auto">
           <a:xfrm>
-            <a:off x="1228004" y="1846281"/>
-            <a:ext cx="2408300" cy="1641764"/>
+            <a:off x="3711134" y="798909"/>
+            <a:ext cx="8191789" cy="5406581"/>
           </a:xfrm>
           <a:prstGeom prst="rect">
             <a:avLst/>
@@ -10809,10 +10106,10 @@
       </p:pic>
       <p:cxnSp>
         <p:nvCxnSpPr>
-          <p:cNvPr id="5" name="Straight Connector 4">
-            <a:extLst>
-              <a:ext uri="{FF2B5EF4-FFF2-40B4-BE49-F238E27FC236}">
-                <a16:creationId xmlns:a16="http://schemas.microsoft.com/office/drawing/2014/main" id="{79AFA27C-3099-4FEC-97E8-25806B5445CB}"/>
+          <p:cNvPr id="6" name="Straight Connector 5">
+            <a:extLst>
+              <a:ext uri="{FF2B5EF4-FFF2-40B4-BE49-F238E27FC236}">
+                <a16:creationId xmlns:a16="http://schemas.microsoft.com/office/drawing/2014/main" id="{DA16A579-8147-4C1D-8040-4FF993E00544}"/>
               </a:ext>
             </a:extLst>
           </p:cNvPr>
@@ -10847,10 +10144,10 @@
       </p:cxnSp>
       <p:cxnSp>
         <p:nvCxnSpPr>
-          <p:cNvPr id="8" name="Straight Connector 7">
-            <a:extLst>
-              <a:ext uri="{FF2B5EF4-FFF2-40B4-BE49-F238E27FC236}">
-                <a16:creationId xmlns:a16="http://schemas.microsoft.com/office/drawing/2014/main" id="{66B125CD-5C80-4E59-A294-02E50C122F8A}"/>
+          <p:cNvPr id="7" name="Straight Connector 6">
+            <a:extLst>
+              <a:ext uri="{FF2B5EF4-FFF2-40B4-BE49-F238E27FC236}">
+                <a16:creationId xmlns:a16="http://schemas.microsoft.com/office/drawing/2014/main" id="{6199237D-FD5E-430A-A041-D64AB0E67DAA}"/>
               </a:ext>
             </a:extLst>
           </p:cNvPr>
@@ -10885,10 +10182,10 @@
       </p:cxnSp>
       <p:pic>
         <p:nvPicPr>
-          <p:cNvPr id="9" name="Picture 8" descr="A picture containing graphical user interface&#10;&#10;Description automatically generated">
-            <a:extLst>
-              <a:ext uri="{FF2B5EF4-FFF2-40B4-BE49-F238E27FC236}">
-                <a16:creationId xmlns:a16="http://schemas.microsoft.com/office/drawing/2014/main" id="{5A0C10CB-6259-4E0E-9416-72562419E8F7}"/>
+          <p:cNvPr id="8" name="Picture 7" descr="A picture containing graphical user interface&#10;&#10;Description automatically generated">
+            <a:extLst>
+              <a:ext uri="{FF2B5EF4-FFF2-40B4-BE49-F238E27FC236}">
+                <a16:creationId xmlns:a16="http://schemas.microsoft.com/office/drawing/2014/main" id="{112A6A55-1DB8-4C1F-AEF8-EC3B675EB3D8}"/>
               </a:ext>
             </a:extLst>
           </p:cNvPr>
@@ -10922,7 +10219,7 @@
     </p:spTree>
     <p:extLst>
       <p:ext uri="{BB962C8B-B14F-4D97-AF65-F5344CB8AC3E}">
-        <p14:creationId xmlns:p14="http://schemas.microsoft.com/office/powerpoint/2010/main" val="1346446995"/>
+        <p14:creationId xmlns:p14="http://schemas.microsoft.com/office/powerpoint/2010/main" val="940530629"/>
       </p:ext>
     </p:extLst>
   </p:cSld>
@@ -11002,7 +10299,7 @@
         <p:spPr>
           <a:xfrm>
             <a:off x="5470162" y="1484942"/>
-            <a:ext cx="5114711" cy="2597186"/>
+            <a:ext cx="5633804" cy="3888116"/>
           </a:xfrm>
           <a:prstGeom prst="rect">
             <a:avLst/>
@@ -11021,71 +10318,115 @@
               </a:lnSpc>
             </a:pPr>
             <a:r>
-              <a:rPr lang="en-GB" sz="2800" b="1" i="0" dirty="0">
-                <a:solidFill>
-                  <a:srgbClr val="202122"/>
-                </a:solidFill>
-                <a:effectLst/>
-                <a:latin typeface="Arial" panose="020B0604020202020204" pitchFamily="34" charset="0"/>
-              </a:rPr>
-              <a:t>Wikidata</a:t>
-            </a:r>
-            <a:r>
-              <a:rPr lang="en-GB" sz="2800" b="0" i="0" dirty="0">
-                <a:solidFill>
-                  <a:srgbClr val="202122"/>
-                </a:solidFill>
-                <a:effectLst/>
-                <a:latin typeface="Arial" panose="020B0604020202020204" pitchFamily="34" charset="0"/>
-              </a:rPr>
-              <a:t> is a free and open </a:t>
-            </a:r>
-            <a:r>
-              <a:rPr lang="en-GB" sz="2800" b="1" i="0" dirty="0">
-                <a:solidFill>
-                  <a:srgbClr val="202122"/>
-                </a:solidFill>
-                <a:effectLst/>
-                <a:latin typeface="Arial" panose="020B0604020202020204" pitchFamily="34" charset="0"/>
-              </a:rPr>
-              <a:t>knowledge base </a:t>
-            </a:r>
-            <a:r>
-              <a:rPr lang="en-GB" sz="2800" b="0" i="0" dirty="0">
-                <a:solidFill>
-                  <a:srgbClr val="202122"/>
-                </a:solidFill>
-                <a:effectLst/>
-                <a:latin typeface="Arial" panose="020B0604020202020204" pitchFamily="34" charset="0"/>
-              </a:rPr>
-              <a:t>that can be read and </a:t>
-            </a:r>
-            <a:r>
-              <a:rPr lang="en-GB" sz="2800" b="1" i="0" dirty="0">
-                <a:solidFill>
-                  <a:srgbClr val="202122"/>
-                </a:solidFill>
-                <a:effectLst/>
-                <a:latin typeface="Arial" panose="020B0604020202020204" pitchFamily="34" charset="0"/>
-              </a:rPr>
-              <a:t>edited</a:t>
-            </a:r>
-            <a:r>
-              <a:rPr lang="en-GB" sz="2800" b="0" i="0" dirty="0">
-                <a:solidFill>
-                  <a:srgbClr val="202122"/>
-                </a:solidFill>
-                <a:effectLst/>
-                <a:latin typeface="Arial" panose="020B0604020202020204" pitchFamily="34" charset="0"/>
-              </a:rPr>
-              <a:t> by both humans and machines.</a:t>
-            </a:r>
-            <a:endParaRPr lang="en-GB" sz="2800" b="1" dirty="0">
-              <a:latin typeface="Century Gothic" panose="020B0502020202020204" pitchFamily="34" charset="0"/>
-            </a:endParaRPr>
+              <a:rPr lang="en-GB" sz="2800" dirty="0">
+                <a:latin typeface="Century Gothic" panose="020B0502020202020204" pitchFamily="34" charset="0"/>
+              </a:rPr>
+              <a:t>DBpedia is a </a:t>
+            </a:r>
+            <a:r>
+              <a:rPr lang="en-GB" sz="2800" b="1" dirty="0">
+                <a:latin typeface="Century Gothic" panose="020B0502020202020204" pitchFamily="34" charset="0"/>
+              </a:rPr>
+              <a:t>crowd-sourced</a:t>
+            </a:r>
+            <a:r>
+              <a:rPr lang="en-GB" sz="2800" dirty="0">
+                <a:latin typeface="Century Gothic" panose="020B0502020202020204" pitchFamily="34" charset="0"/>
+              </a:rPr>
+              <a:t> community effort to extract </a:t>
+            </a:r>
+            <a:r>
+              <a:rPr lang="en-GB" sz="2800" b="1" dirty="0">
+                <a:latin typeface="Century Gothic" panose="020B0502020202020204" pitchFamily="34" charset="0"/>
+              </a:rPr>
+              <a:t>structured information </a:t>
+            </a:r>
+            <a:r>
+              <a:rPr lang="en-GB" sz="2800" dirty="0">
+                <a:latin typeface="Century Gothic" panose="020B0502020202020204" pitchFamily="34" charset="0"/>
+              </a:rPr>
+              <a:t>from </a:t>
+            </a:r>
+            <a:r>
+              <a:rPr lang="en-GB" sz="2800" b="1" dirty="0">
+                <a:latin typeface="Century Gothic" panose="020B0502020202020204" pitchFamily="34" charset="0"/>
+              </a:rPr>
+              <a:t>Wikipedia</a:t>
+            </a:r>
+            <a:r>
+              <a:rPr lang="en-GB" sz="2800" dirty="0">
+                <a:latin typeface="Century Gothic" panose="020B0502020202020204" pitchFamily="34" charset="0"/>
+              </a:rPr>
+              <a:t> and make this information available on the </a:t>
+            </a:r>
+            <a:r>
+              <a:rPr lang="en-GB" sz="2800" b="1" dirty="0">
+                <a:latin typeface="Century Gothic" panose="020B0502020202020204" pitchFamily="34" charset="0"/>
+              </a:rPr>
+              <a:t>Web</a:t>
+            </a:r>
+            <a:r>
+              <a:rPr lang="en-GB" sz="2800" dirty="0">
+                <a:latin typeface="Century Gothic" panose="020B0502020202020204" pitchFamily="34" charset="0"/>
+              </a:rPr>
+              <a:t> in the form of </a:t>
+            </a:r>
+            <a:r>
+              <a:rPr lang="en-GB" sz="2800" b="1" dirty="0">
+                <a:latin typeface="Century Gothic" panose="020B0502020202020204" pitchFamily="34" charset="0"/>
+              </a:rPr>
+              <a:t>Linked Data.</a:t>
+            </a:r>
           </a:p>
         </p:txBody>
       </p:sp>
+      <p:pic>
+        <p:nvPicPr>
+          <p:cNvPr id="3074" name="Picture 2" descr="DBpedia - Wikipedia">
+            <a:extLst>
+              <a:ext uri="{FF2B5EF4-FFF2-40B4-BE49-F238E27FC236}">
+                <a16:creationId xmlns:a16="http://schemas.microsoft.com/office/drawing/2014/main" id="{9503E14A-6A42-48B6-A865-8281C6D72F38}"/>
+              </a:ext>
+            </a:extLst>
+          </p:cNvPr>
+          <p:cNvPicPr>
+            <a:picLocks noChangeAspect="1" noChangeArrowheads="1"/>
+          </p:cNvPicPr>
+          <p:nvPr/>
+        </p:nvPicPr>
+        <p:blipFill>
+          <a:blip r:embed="rId2">
+            <a:extLst>
+              <a:ext uri="{28A0092B-C50C-407E-A947-70E740481C1C}">
+                <a14:useLocalDpi xmlns:a14="http://schemas.microsoft.com/office/drawing/2010/main" val="0"/>
+              </a:ext>
+            </a:extLst>
+          </a:blip>
+          <a:srcRect/>
+          <a:stretch>
+            <a:fillRect/>
+          </a:stretch>
+        </p:blipFill>
+        <p:spPr bwMode="auto">
+          <a:xfrm>
+            <a:off x="1228004" y="1846281"/>
+            <a:ext cx="2408300" cy="1641764"/>
+          </a:xfrm>
+          <a:prstGeom prst="rect">
+            <a:avLst/>
+          </a:prstGeom>
+          <a:noFill/>
+          <a:extLst>
+            <a:ext uri="{909E8E84-426E-40DD-AFC4-6F175D3DCCD1}">
+              <a14:hiddenFill xmlns:a14="http://schemas.microsoft.com/office/drawing/2010/main">
+                <a:solidFill>
+                  <a:srgbClr val="FFFFFF"/>
+                </a:solidFill>
+              </a14:hiddenFill>
+            </a:ext>
+          </a:extLst>
+        </p:spPr>
+      </p:pic>
       <p:cxnSp>
         <p:nvCxnSpPr>
           <p:cNvPr id="5" name="Straight Connector 4">
@@ -11177,7 +10518,7 @@
           <p:nvPr/>
         </p:nvPicPr>
         <p:blipFill>
-          <a:blip r:embed="rId2">
+          <a:blip r:embed="rId3">
             <a:extLst>
               <a:ext uri="{28A0092B-C50C-407E-A947-70E740481C1C}">
                 <a14:useLocalDpi xmlns:a14="http://schemas.microsoft.com/office/drawing/2010/main" val="0"/>
@@ -11198,49 +10539,10 @@
           </a:prstGeom>
         </p:spPr>
       </p:pic>
-      <p:pic>
-        <p:nvPicPr>
-          <p:cNvPr id="4" name="Graphic 3">
-            <a:extLst>
-              <a:ext uri="{FF2B5EF4-FFF2-40B4-BE49-F238E27FC236}">
-                <a16:creationId xmlns:a16="http://schemas.microsoft.com/office/drawing/2014/main" id="{7F6C1776-A0E6-4925-8714-8A3B57D6A061}"/>
-              </a:ext>
-            </a:extLst>
-          </p:cNvPr>
-          <p:cNvPicPr>
-            <a:picLocks noChangeAspect="1"/>
-          </p:cNvPicPr>
-          <p:nvPr/>
-        </p:nvPicPr>
-        <p:blipFill>
-          <a:blip r:embed="rId3">
-            <a:extLst>
-              <a:ext uri="{28A0092B-C50C-407E-A947-70E740481C1C}">
-                <a14:useLocalDpi xmlns:a14="http://schemas.microsoft.com/office/drawing/2010/main" val="0"/>
-              </a:ext>
-              <a:ext uri="{96DAC541-7B7A-43D3-8B79-37D633B846F1}">
-                <asvg:svgBlip xmlns:asvg="http://schemas.microsoft.com/office/drawing/2016/SVG/main" r:embed="rId4"/>
-              </a:ext>
-            </a:extLst>
-          </a:blip>
-          <a:stretch>
-            <a:fillRect/>
-          </a:stretch>
-        </p:blipFill>
-        <p:spPr>
-          <a:xfrm>
-            <a:off x="1241519" y="1922105"/>
-            <a:ext cx="2271067" cy="1606154"/>
-          </a:xfrm>
-          <a:prstGeom prst="rect">
-            <a:avLst/>
-          </a:prstGeom>
-        </p:spPr>
-      </p:pic>
     </p:spTree>
     <p:extLst>
       <p:ext uri="{BB962C8B-B14F-4D97-AF65-F5344CB8AC3E}">
-        <p14:creationId xmlns:p14="http://schemas.microsoft.com/office/powerpoint/2010/main" val="687366289"/>
+        <p14:creationId xmlns:p14="http://schemas.microsoft.com/office/powerpoint/2010/main" val="1346446995"/>
       </p:ext>
     </p:extLst>
   </p:cSld>
@@ -11253,14 +10555,6 @@
 <file path=ppt/slides/slide7.xml><?xml version="1.0" encoding="utf-8"?>
 <p:sld xmlns:a="http://schemas.openxmlformats.org/drawingml/2006/main" xmlns:r="http://schemas.openxmlformats.org/officeDocument/2006/relationships" xmlns:p="http://schemas.openxmlformats.org/presentationml/2006/main">
   <p:cSld>
-    <p:bg>
-      <p:bgPr>
-        <a:solidFill>
-          <a:schemeClr val="bg1"/>
-        </a:solidFill>
-        <a:effectLst/>
-      </p:bgPr>
-    </p:bg>
     <p:spTree>
       <p:nvGrpSpPr>
         <p:cNvPr id="1" name=""/>
@@ -11275,101 +10569,138 @@
           <a:chExt cx="0" cy="0"/>
         </a:xfrm>
       </p:grpSpPr>
+      <p:cxnSp>
+        <p:nvCxnSpPr>
+          <p:cNvPr id="6" name="Straight Connector 5">
+            <a:extLst>
+              <a:ext uri="{FF2B5EF4-FFF2-40B4-BE49-F238E27FC236}">
+                <a16:creationId xmlns:a16="http://schemas.microsoft.com/office/drawing/2014/main" id="{EE778828-E6A8-4C32-AFA1-4EACFABCA95B}"/>
+              </a:ext>
+            </a:extLst>
+          </p:cNvPr>
+          <p:cNvCxnSpPr>
+            <a:cxnSpLocks/>
+          </p:cNvCxnSpPr>
+          <p:nvPr/>
+        </p:nvCxnSpPr>
+        <p:spPr>
+          <a:xfrm flipV="1">
+            <a:off x="959371" y="3636550"/>
+            <a:ext cx="2945567" cy="26790"/>
+          </a:xfrm>
+          <a:prstGeom prst="line">
+            <a:avLst/>
+          </a:prstGeom>
+        </p:spPr>
+        <p:style>
+          <a:lnRef idx="3">
+            <a:schemeClr val="accent4"/>
+          </a:lnRef>
+          <a:fillRef idx="0">
+            <a:schemeClr val="accent4"/>
+          </a:fillRef>
+          <a:effectRef idx="2">
+            <a:schemeClr val="accent4"/>
+          </a:effectRef>
+          <a:fontRef idx="minor">
+            <a:schemeClr val="tx1"/>
+          </a:fontRef>
+        </p:style>
+      </p:cxnSp>
       <p:sp>
         <p:nvSpPr>
-          <p:cNvPr id="4" name="Rectangle 3">
-            <a:extLst>
-              <a:ext uri="{FF2B5EF4-FFF2-40B4-BE49-F238E27FC236}">
-                <a16:creationId xmlns:a16="http://schemas.microsoft.com/office/drawing/2014/main" id="{70804784-4D7E-4E3E-8101-B343AAE608EA}"/>
-              </a:ext>
-            </a:extLst>
-          </p:cNvPr>
-          <p:cNvSpPr/>
+          <p:cNvPr id="7" name="TextBox 6">
+            <a:extLst>
+              <a:ext uri="{FF2B5EF4-FFF2-40B4-BE49-F238E27FC236}">
+                <a16:creationId xmlns:a16="http://schemas.microsoft.com/office/drawing/2014/main" id="{296DEE2C-E6A1-4E8D-867C-AB85526237D5}"/>
+              </a:ext>
+            </a:extLst>
+          </p:cNvPr>
+          <p:cNvSpPr txBox="1"/>
           <p:nvPr/>
         </p:nvSpPr>
         <p:spPr>
           <a:xfrm>
-            <a:off x="4045527" y="0"/>
-            <a:ext cx="8146473" cy="6858000"/>
+            <a:off x="5470162" y="1484942"/>
+            <a:ext cx="5114711" cy="2597186"/>
           </a:xfrm>
           <a:prstGeom prst="rect">
             <a:avLst/>
           </a:prstGeom>
-          <a:solidFill>
-            <a:schemeClr val="bg1"/>
-          </a:solidFill>
-          <a:ln>
-            <a:noFill/>
-          </a:ln>
-        </p:spPr>
-        <p:style>
-          <a:lnRef idx="2">
-            <a:schemeClr val="accent1">
-              <a:shade val="50000"/>
-            </a:schemeClr>
-          </a:lnRef>
-          <a:fillRef idx="1">
-            <a:schemeClr val="accent1"/>
-          </a:fillRef>
-          <a:effectRef idx="0">
-            <a:schemeClr val="accent1"/>
-          </a:effectRef>
-          <a:fontRef idx="minor">
-            <a:schemeClr val="lt1"/>
-          </a:fontRef>
-        </p:style>
+          <a:noFill/>
+        </p:spPr>
         <p:txBody>
-          <a:bodyPr rtlCol="0" anchor="ctr"/>
-          <a:lstStyle/>
-          <a:p>
-            <a:pPr algn="ctr"/>
-            <a:endParaRPr lang="en-GB"/>
-          </a:p>
-        </p:txBody>
-      </p:sp>
-      <p:sp>
-        <p:nvSpPr>
-          <p:cNvPr id="2" name="TextBox 1">
-            <a:extLst>
-              <a:ext uri="{FF2B5EF4-FFF2-40B4-BE49-F238E27FC236}">
-                <a16:creationId xmlns:a16="http://schemas.microsoft.com/office/drawing/2014/main" id="{CA25965A-CD20-4D39-996E-6E0FC4A2643B}"/>
-              </a:ext>
-            </a:extLst>
-          </p:cNvPr>
-          <p:cNvSpPr txBox="1"/>
-          <p:nvPr/>
-        </p:nvSpPr>
-        <p:spPr>
-          <a:xfrm>
-            <a:off x="808450" y="2470758"/>
-            <a:ext cx="2470548" cy="1754326"/>
-          </a:xfrm>
-          <a:prstGeom prst="rect">
-            <a:avLst/>
-          </a:prstGeom>
-          <a:noFill/>
-        </p:spPr>
-        <p:txBody>
-          <a:bodyPr wrap="none" rtlCol="0">
+          <a:bodyPr wrap="square">
             <a:spAutoFit/>
           </a:bodyPr>
           <a:lstStyle/>
           <a:p>
-            <a:r>
-              <a:rPr lang="en-GB" sz="5400" b="1" dirty="0">
-                <a:latin typeface="Century Gothic" panose="020B0502020202020204" pitchFamily="34" charset="0"/>
-              </a:rPr>
-              <a:t>LINKED</a:t>
-            </a:r>
-          </a:p>
-          <a:p>
-            <a:r>
-              <a:rPr lang="en-GB" sz="5400" b="1" dirty="0">
-                <a:latin typeface="Century Gothic" panose="020B0502020202020204" pitchFamily="34" charset="0"/>
-              </a:rPr>
-              <a:t>DATA</a:t>
-            </a:r>
-            <a:endParaRPr lang="en-GB" sz="3600" b="1" dirty="0">
+            <a:pPr>
+              <a:lnSpc>
+                <a:spcPct val="150000"/>
+              </a:lnSpc>
+            </a:pPr>
+            <a:r>
+              <a:rPr lang="en-GB" sz="2800" b="1" i="0" dirty="0">
+                <a:solidFill>
+                  <a:srgbClr val="202122"/>
+                </a:solidFill>
+                <a:effectLst/>
+                <a:latin typeface="Arial" panose="020B0604020202020204" pitchFamily="34" charset="0"/>
+              </a:rPr>
+              <a:t>Wikidata</a:t>
+            </a:r>
+            <a:r>
+              <a:rPr lang="en-GB" sz="2800" b="0" i="0" dirty="0">
+                <a:solidFill>
+                  <a:srgbClr val="202122"/>
+                </a:solidFill>
+                <a:effectLst/>
+                <a:latin typeface="Arial" panose="020B0604020202020204" pitchFamily="34" charset="0"/>
+              </a:rPr>
+              <a:t> is a free and open </a:t>
+            </a:r>
+            <a:r>
+              <a:rPr lang="en-GB" sz="2800" b="1" i="0" dirty="0">
+                <a:solidFill>
+                  <a:srgbClr val="202122"/>
+                </a:solidFill>
+                <a:effectLst/>
+                <a:latin typeface="Arial" panose="020B0604020202020204" pitchFamily="34" charset="0"/>
+              </a:rPr>
+              <a:t>knowledge base </a:t>
+            </a:r>
+            <a:r>
+              <a:rPr lang="en-GB" sz="2800" b="0" i="0" dirty="0">
+                <a:solidFill>
+                  <a:srgbClr val="202122"/>
+                </a:solidFill>
+                <a:effectLst/>
+                <a:latin typeface="Arial" panose="020B0604020202020204" pitchFamily="34" charset="0"/>
+              </a:rPr>
+              <a:t>that can be read and </a:t>
+            </a:r>
+            <a:r>
+              <a:rPr lang="en-GB" sz="2800" b="1" i="0" dirty="0">
+                <a:solidFill>
+                  <a:srgbClr val="202122"/>
+                </a:solidFill>
+                <a:effectLst/>
+                <a:latin typeface="Arial" panose="020B0604020202020204" pitchFamily="34" charset="0"/>
+              </a:rPr>
+              <a:t>edited</a:t>
+            </a:r>
+            <a:r>
+              <a:rPr lang="en-GB" sz="2800" b="0" i="0" dirty="0">
+                <a:solidFill>
+                  <a:srgbClr val="202122"/>
+                </a:solidFill>
+                <a:effectLst/>
+                <a:latin typeface="Arial" panose="020B0604020202020204" pitchFamily="34" charset="0"/>
+              </a:rPr>
+              <a:t> by both humans and machines.</a:t>
+            </a:r>
+            <a:endParaRPr lang="en-GB" sz="2800" b="1" dirty="0">
               <a:latin typeface="Century Gothic" panose="020B0502020202020204" pitchFamily="34" charset="0"/>
             </a:endParaRPr>
           </a:p>
@@ -11377,10 +10708,10 @@
       </p:sp>
       <p:cxnSp>
         <p:nvCxnSpPr>
-          <p:cNvPr id="3" name="Straight Connector 2">
-            <a:extLst>
-              <a:ext uri="{FF2B5EF4-FFF2-40B4-BE49-F238E27FC236}">
-                <a16:creationId xmlns:a16="http://schemas.microsoft.com/office/drawing/2014/main" id="{FAE8FE6B-8962-4A65-9480-07BB6048FE1A}"/>
+          <p:cNvPr id="5" name="Straight Connector 4">
+            <a:extLst>
+              <a:ext uri="{FF2B5EF4-FFF2-40B4-BE49-F238E27FC236}">
+                <a16:creationId xmlns:a16="http://schemas.microsoft.com/office/drawing/2014/main" id="{79AFA27C-3099-4FEC-97E8-25806B5445CB}"/>
               </a:ext>
             </a:extLst>
           </p:cNvPr>
@@ -11391,8 +10722,46 @@
         </p:nvCxnSpPr>
         <p:spPr>
           <a:xfrm>
-            <a:off x="808450" y="4320288"/>
-            <a:ext cx="2345960" cy="0"/>
+            <a:off x="-12977" y="4984140"/>
+            <a:ext cx="1910829" cy="1873860"/>
+          </a:xfrm>
+          <a:prstGeom prst="line">
+            <a:avLst/>
+          </a:prstGeom>
+        </p:spPr>
+        <p:style>
+          <a:lnRef idx="3">
+            <a:schemeClr val="accent4"/>
+          </a:lnRef>
+          <a:fillRef idx="0">
+            <a:schemeClr val="accent4"/>
+          </a:fillRef>
+          <a:effectRef idx="2">
+            <a:schemeClr val="accent4"/>
+          </a:effectRef>
+          <a:fontRef idx="minor">
+            <a:schemeClr val="tx1"/>
+          </a:fontRef>
+        </p:style>
+      </p:cxnSp>
+      <p:cxnSp>
+        <p:nvCxnSpPr>
+          <p:cNvPr id="8" name="Straight Connector 7">
+            <a:extLst>
+              <a:ext uri="{FF2B5EF4-FFF2-40B4-BE49-F238E27FC236}">
+                <a16:creationId xmlns:a16="http://schemas.microsoft.com/office/drawing/2014/main" id="{66B125CD-5C80-4E59-A294-02E50C122F8A}"/>
+              </a:ext>
+            </a:extLst>
+          </p:cNvPr>
+          <p:cNvCxnSpPr>
+            <a:cxnSpLocks/>
+          </p:cNvCxnSpPr>
+          <p:nvPr/>
+        </p:nvCxnSpPr>
+        <p:spPr>
+          <a:xfrm>
+            <a:off x="3956" y="4907940"/>
+            <a:ext cx="1977244" cy="1950060"/>
           </a:xfrm>
           <a:prstGeom prst="line">
             <a:avLst/>
@@ -11415,143 +10784,20 @@
       </p:cxnSp>
       <p:pic>
         <p:nvPicPr>
-          <p:cNvPr id="2050" name="Picture 2" descr="Linking Open Data cloud diagram, by Richard Cyganiak and Anja Jentzsch....  | Download Scientific Diagram">
-            <a:extLst>
-              <a:ext uri="{FF2B5EF4-FFF2-40B4-BE49-F238E27FC236}">
-                <a16:creationId xmlns:a16="http://schemas.microsoft.com/office/drawing/2014/main" id="{BB04F971-917A-49CD-B5B7-B438C5E1FD6D}"/>
+          <p:cNvPr id="9" name="Picture 8" descr="A picture containing graphical user interface&#10;&#10;Description automatically generated">
+            <a:extLst>
+              <a:ext uri="{FF2B5EF4-FFF2-40B4-BE49-F238E27FC236}">
+                <a16:creationId xmlns:a16="http://schemas.microsoft.com/office/drawing/2014/main" id="{5A0C10CB-6259-4E0E-9416-72562419E8F7}"/>
               </a:ext>
             </a:extLst>
           </p:cNvPr>
           <p:cNvPicPr>
-            <a:picLocks noChangeAspect="1" noChangeArrowheads="1"/>
+            <a:picLocks noChangeAspect="1"/>
           </p:cNvPicPr>
           <p:nvPr/>
         </p:nvPicPr>
         <p:blipFill>
           <a:blip r:embed="rId2">
-            <a:extLst>
-              <a:ext uri="{28A0092B-C50C-407E-A947-70E740481C1C}">
-                <a14:useLocalDpi xmlns:a14="http://schemas.microsoft.com/office/drawing/2010/main" val="0"/>
-              </a:ext>
-            </a:extLst>
-          </a:blip>
-          <a:srcRect/>
-          <a:stretch>
-            <a:fillRect/>
-          </a:stretch>
-        </p:blipFill>
-        <p:spPr bwMode="auto">
-          <a:xfrm>
-            <a:off x="3711134" y="798909"/>
-            <a:ext cx="8191789" cy="5406581"/>
-          </a:xfrm>
-          <a:prstGeom prst="rect">
-            <a:avLst/>
-          </a:prstGeom>
-          <a:noFill/>
-          <a:extLst>
-            <a:ext uri="{909E8E84-426E-40DD-AFC4-6F175D3DCCD1}">
-              <a14:hiddenFill xmlns:a14="http://schemas.microsoft.com/office/drawing/2010/main">
-                <a:solidFill>
-                  <a:srgbClr val="FFFFFF"/>
-                </a:solidFill>
-              </a14:hiddenFill>
-            </a:ext>
-          </a:extLst>
-        </p:spPr>
-      </p:pic>
-      <p:cxnSp>
-        <p:nvCxnSpPr>
-          <p:cNvPr id="6" name="Straight Connector 5">
-            <a:extLst>
-              <a:ext uri="{FF2B5EF4-FFF2-40B4-BE49-F238E27FC236}">
-                <a16:creationId xmlns:a16="http://schemas.microsoft.com/office/drawing/2014/main" id="{DA16A579-8147-4C1D-8040-4FF993E00544}"/>
-              </a:ext>
-            </a:extLst>
-          </p:cNvPr>
-          <p:cNvCxnSpPr>
-            <a:cxnSpLocks/>
-          </p:cNvCxnSpPr>
-          <p:nvPr/>
-        </p:nvCxnSpPr>
-        <p:spPr>
-          <a:xfrm>
-            <a:off x="-12977" y="4984140"/>
-            <a:ext cx="1910829" cy="1873860"/>
-          </a:xfrm>
-          <a:prstGeom prst="line">
-            <a:avLst/>
-          </a:prstGeom>
-        </p:spPr>
-        <p:style>
-          <a:lnRef idx="3">
-            <a:schemeClr val="accent4"/>
-          </a:lnRef>
-          <a:fillRef idx="0">
-            <a:schemeClr val="accent4"/>
-          </a:fillRef>
-          <a:effectRef idx="2">
-            <a:schemeClr val="accent4"/>
-          </a:effectRef>
-          <a:fontRef idx="minor">
-            <a:schemeClr val="tx1"/>
-          </a:fontRef>
-        </p:style>
-      </p:cxnSp>
-      <p:cxnSp>
-        <p:nvCxnSpPr>
-          <p:cNvPr id="7" name="Straight Connector 6">
-            <a:extLst>
-              <a:ext uri="{FF2B5EF4-FFF2-40B4-BE49-F238E27FC236}">
-                <a16:creationId xmlns:a16="http://schemas.microsoft.com/office/drawing/2014/main" id="{6199237D-FD5E-430A-A041-D64AB0E67DAA}"/>
-              </a:ext>
-            </a:extLst>
-          </p:cNvPr>
-          <p:cNvCxnSpPr>
-            <a:cxnSpLocks/>
-          </p:cNvCxnSpPr>
-          <p:nvPr/>
-        </p:nvCxnSpPr>
-        <p:spPr>
-          <a:xfrm>
-            <a:off x="3956" y="4907940"/>
-            <a:ext cx="1977244" cy="1950060"/>
-          </a:xfrm>
-          <a:prstGeom prst="line">
-            <a:avLst/>
-          </a:prstGeom>
-        </p:spPr>
-        <p:style>
-          <a:lnRef idx="3">
-            <a:schemeClr val="accent4"/>
-          </a:lnRef>
-          <a:fillRef idx="0">
-            <a:schemeClr val="accent4"/>
-          </a:fillRef>
-          <a:effectRef idx="2">
-            <a:schemeClr val="accent4"/>
-          </a:effectRef>
-          <a:fontRef idx="minor">
-            <a:schemeClr val="tx1"/>
-          </a:fontRef>
-        </p:style>
-      </p:cxnSp>
-      <p:pic>
-        <p:nvPicPr>
-          <p:cNvPr id="8" name="Picture 7" descr="A picture containing graphical user interface&#10;&#10;Description automatically generated">
-            <a:extLst>
-              <a:ext uri="{FF2B5EF4-FFF2-40B4-BE49-F238E27FC236}">
-                <a16:creationId xmlns:a16="http://schemas.microsoft.com/office/drawing/2014/main" id="{112A6A55-1DB8-4C1F-AEF8-EC3B675EB3D8}"/>
-              </a:ext>
-            </a:extLst>
-          </p:cNvPr>
-          <p:cNvPicPr>
-            <a:picLocks noChangeAspect="1"/>
-          </p:cNvPicPr>
-          <p:nvPr/>
-        </p:nvPicPr>
-        <p:blipFill>
-          <a:blip r:embed="rId3">
             <a:extLst>
               <a:ext uri="{28A0092B-C50C-407E-A947-70E740481C1C}">
                 <a14:useLocalDpi xmlns:a14="http://schemas.microsoft.com/office/drawing/2010/main" val="0"/>
@@ -11572,10 +10818,49 @@
           </a:prstGeom>
         </p:spPr>
       </p:pic>
+      <p:pic>
+        <p:nvPicPr>
+          <p:cNvPr id="4" name="Graphic 3">
+            <a:extLst>
+              <a:ext uri="{FF2B5EF4-FFF2-40B4-BE49-F238E27FC236}">
+                <a16:creationId xmlns:a16="http://schemas.microsoft.com/office/drawing/2014/main" id="{7F6C1776-A0E6-4925-8714-8A3B57D6A061}"/>
+              </a:ext>
+            </a:extLst>
+          </p:cNvPr>
+          <p:cNvPicPr>
+            <a:picLocks noChangeAspect="1"/>
+          </p:cNvPicPr>
+          <p:nvPr/>
+        </p:nvPicPr>
+        <p:blipFill>
+          <a:blip r:embed="rId3">
+            <a:extLst>
+              <a:ext uri="{28A0092B-C50C-407E-A947-70E740481C1C}">
+                <a14:useLocalDpi xmlns:a14="http://schemas.microsoft.com/office/drawing/2010/main" val="0"/>
+              </a:ext>
+              <a:ext uri="{96DAC541-7B7A-43D3-8B79-37D633B846F1}">
+                <asvg:svgBlip xmlns:asvg="http://schemas.microsoft.com/office/drawing/2016/SVG/main" r:embed="rId4"/>
+              </a:ext>
+            </a:extLst>
+          </a:blip>
+          <a:stretch>
+            <a:fillRect/>
+          </a:stretch>
+        </p:blipFill>
+        <p:spPr>
+          <a:xfrm>
+            <a:off x="1241519" y="1922105"/>
+            <a:ext cx="2271067" cy="1606154"/>
+          </a:xfrm>
+          <a:prstGeom prst="rect">
+            <a:avLst/>
+          </a:prstGeom>
+        </p:spPr>
+      </p:pic>
     </p:spTree>
     <p:extLst>
       <p:ext uri="{BB962C8B-B14F-4D97-AF65-F5344CB8AC3E}">
-        <p14:creationId xmlns:p14="http://schemas.microsoft.com/office/powerpoint/2010/main" val="940530629"/>
+        <p14:creationId xmlns:p14="http://schemas.microsoft.com/office/powerpoint/2010/main" val="687366289"/>
       </p:ext>
     </p:extLst>
   </p:cSld>

</xml_diff>